<commit_message>
added draft-ietf-opsawg-oam-characterization in lightning talks
</commit_message>
<xml_diff>
--- a/ietf122-bangkok/chair-slides.pptx
+++ b/ietf122-bangkok/chair-slides.pptx
@@ -317,9 +317,54 @@
 <file path=ppt/revisionInfo.xml><?xml version="1.0" encoding="utf-8"?>
 <p1510:revInfo xmlns:a="http://schemas.openxmlformats.org/drawingml/2006/main" xmlns:r="http://schemas.openxmlformats.org/officeDocument/2006/relationships" xmlns:p1510="http://schemas.microsoft.com/office/powerpoint/2015/10/main">
   <p1510:revLst>
-    <p1510:client id="{96A7D8F5-F931-4029-94A3-9DE2FDEE9A1D}" v="4" dt="2025-03-13T14:55:04.669"/>
+    <p1510:client id="{7B6534E2-35DC-4C61-A1C5-6C82F9BBD5E7}" v="2" dt="2025-03-18T00:13:39.723"/>
   </p1510:revLst>
 </p1510:revInfo>
+</file>
+
+<file path=ppt/changesInfos/changesInfo1.xml><?xml version="1.0" encoding="utf-8"?>
+<pc:chgInfo xmlns:a="http://schemas.openxmlformats.org/drawingml/2006/main" xmlns:r="http://schemas.openxmlformats.org/officeDocument/2006/relationships" xmlns:ac="http://schemas.microsoft.com/office/drawing/2013/main/command" xmlns:pc="http://schemas.microsoft.com/office/powerpoint/2013/main/command">
+  <pc:docChgLst>
+    <pc:chgData name="Graf Thomas, INI-NET-VNC-E2E" userId="487bc3e3-9ce7-4cdd-b7b4-8899ea88d289" providerId="ADAL" clId="{7B6534E2-35DC-4C61-A1C5-6C82F9BBD5E7}"/>
+    <pc:docChg chg="undo custSel modSld">
+      <pc:chgData name="Graf Thomas, INI-NET-VNC-E2E" userId="487bc3e3-9ce7-4cdd-b7b4-8899ea88d289" providerId="ADAL" clId="{7B6534E2-35DC-4C61-A1C5-6C82F9BBD5E7}" dt="2025-03-18T00:14:42.402" v="52" actId="1076"/>
+      <pc:docMkLst>
+        <pc:docMk/>
+      </pc:docMkLst>
+      <pc:sldChg chg="addSp modSp mod">
+        <pc:chgData name="Graf Thomas, INI-NET-VNC-E2E" userId="487bc3e3-9ce7-4cdd-b7b4-8899ea88d289" providerId="ADAL" clId="{7B6534E2-35DC-4C61-A1C5-6C82F9BBD5E7}" dt="2025-03-18T00:14:42.402" v="52" actId="1076"/>
+        <pc:sldMkLst>
+          <pc:docMk/>
+          <pc:sldMk cId="703495152" sldId="264"/>
+        </pc:sldMkLst>
+        <pc:spChg chg="add mod">
+          <ac:chgData name="Graf Thomas, INI-NET-VNC-E2E" userId="487bc3e3-9ce7-4cdd-b7b4-8899ea88d289" providerId="ADAL" clId="{7B6534E2-35DC-4C61-A1C5-6C82F9BBD5E7}" dt="2025-03-18T00:14:42.402" v="52" actId="1076"/>
+          <ac:spMkLst>
+            <pc:docMk/>
+            <pc:sldMk cId="703495152" sldId="264"/>
+            <ac:spMk id="5" creationId="{4415A45C-D066-654C-3989-5671669230C8}"/>
+          </ac:spMkLst>
+        </pc:spChg>
+        <pc:spChg chg="add mod">
+          <ac:chgData name="Graf Thomas, INI-NET-VNC-E2E" userId="487bc3e3-9ce7-4cdd-b7b4-8899ea88d289" providerId="ADAL" clId="{7B6534E2-35DC-4C61-A1C5-6C82F9BBD5E7}" dt="2025-03-18T00:12:54.330" v="50" actId="1037"/>
+          <ac:spMkLst>
+            <pc:docMk/>
+            <pc:sldMk cId="703495152" sldId="264"/>
+            <ac:spMk id="6" creationId="{56370054-45B6-FE84-EE9A-AAE2E1DB87A7}"/>
+          </ac:spMkLst>
+        </pc:spChg>
+        <pc:picChg chg="mod">
+          <ac:chgData name="Graf Thomas, INI-NET-VNC-E2E" userId="487bc3e3-9ce7-4cdd-b7b4-8899ea88d289" providerId="ADAL" clId="{7B6534E2-35DC-4C61-A1C5-6C82F9BBD5E7}" dt="2025-03-18T00:12:28.979" v="23" actId="1076"/>
+          <ac:picMkLst>
+            <pc:docMk/>
+            <pc:sldMk cId="703495152" sldId="264"/>
+            <ac:picMk id="8" creationId="{E2F7522F-557D-860E-D3BE-CBE62A0A71C3}"/>
+          </ac:picMkLst>
+        </pc:picChg>
+      </pc:sldChg>
+    </pc:docChg>
+  </pc:docChgLst>
+</pc:chgInfo>
 </file>
 
 <file path=ppt/notesMasters/notesMaster1.xml><?xml version="1.0" encoding="utf-8"?>
@@ -21424,6 +21469,142 @@
           </a:prstGeom>
         </p:spPr>
       </p:pic>
+      <p:sp>
+        <p:nvSpPr>
+          <p:cNvPr id="5" name="TextBox 4">
+            <a:extLst>
+              <a:ext uri="{FF2B5EF4-FFF2-40B4-BE49-F238E27FC236}">
+                <a16:creationId xmlns:a16="http://schemas.microsoft.com/office/drawing/2014/main" id="{4415A45C-D066-654C-3989-5671669230C8}"/>
+              </a:ext>
+            </a:extLst>
+          </p:cNvPr>
+          <p:cNvSpPr txBox="1"/>
+          <p:nvPr/>
+        </p:nvSpPr>
+        <p:spPr>
+          <a:xfrm>
+            <a:off x="1665297" y="3410195"/>
+            <a:ext cx="2657324" cy="246221"/>
+          </a:xfrm>
+          <a:prstGeom prst="rect">
+            <a:avLst/>
+          </a:prstGeom>
+          <a:noFill/>
+        </p:spPr>
+        <p:txBody>
+          <a:bodyPr wrap="square">
+            <a:spAutoFit/>
+          </a:bodyPr>
+          <a:lstStyle/>
+          <a:p>
+            <a:r>
+              <a:rPr lang="en-GB" sz="1000" dirty="0">
+                <a:solidFill>
+                  <a:schemeClr val="accent4"/>
+                </a:solidFill>
+                <a:latin typeface="Inter" panose="020B0604020202020204" charset="0"/>
+                <a:ea typeface="Inter" panose="020B0604020202020204" charset="0"/>
+              </a:rPr>
+              <a:t>draft-</a:t>
+            </a:r>
+            <a:r>
+              <a:rPr lang="en-GB" sz="1000" dirty="0" err="1">
+                <a:solidFill>
+                  <a:schemeClr val="accent4"/>
+                </a:solidFill>
+                <a:latin typeface="Inter" panose="020B0604020202020204" charset="0"/>
+                <a:ea typeface="Inter" panose="020B0604020202020204" charset="0"/>
+              </a:rPr>
+              <a:t>ietf</a:t>
+            </a:r>
+            <a:r>
+              <a:rPr lang="en-GB" sz="1000" dirty="0">
+                <a:solidFill>
+                  <a:schemeClr val="accent4"/>
+                </a:solidFill>
+                <a:latin typeface="Inter" panose="020B0604020202020204" charset="0"/>
+                <a:ea typeface="Inter" panose="020B0604020202020204" charset="0"/>
+              </a:rPr>
+              <a:t>-opsawg-</a:t>
+            </a:r>
+            <a:r>
+              <a:rPr lang="en-GB" sz="1000" dirty="0" err="1">
+                <a:solidFill>
+                  <a:schemeClr val="accent4"/>
+                </a:solidFill>
+                <a:latin typeface="Inter" panose="020B0604020202020204" charset="0"/>
+                <a:ea typeface="Inter" panose="020B0604020202020204" charset="0"/>
+              </a:rPr>
+              <a:t>oam</a:t>
+            </a:r>
+            <a:r>
+              <a:rPr lang="en-GB" sz="1000" dirty="0">
+                <a:solidFill>
+                  <a:schemeClr val="accent4"/>
+                </a:solidFill>
+                <a:latin typeface="Inter" panose="020B0604020202020204" charset="0"/>
+                <a:ea typeface="Inter" panose="020B0604020202020204" charset="0"/>
+              </a:rPr>
+              <a:t>-characterization</a:t>
+            </a:r>
+            <a:endParaRPr lang="de-CH" sz="1000" dirty="0">
+              <a:solidFill>
+                <a:schemeClr val="accent4"/>
+              </a:solidFill>
+              <a:latin typeface="Inter" panose="020B0604020202020204" charset="0"/>
+              <a:ea typeface="Inter" panose="020B0604020202020204" charset="0"/>
+            </a:endParaRPr>
+          </a:p>
+        </p:txBody>
+      </p:sp>
+      <p:sp>
+        <p:nvSpPr>
+          <p:cNvPr id="6" name="TextBox 5">
+            <a:extLst>
+              <a:ext uri="{FF2B5EF4-FFF2-40B4-BE49-F238E27FC236}">
+                <a16:creationId xmlns:a16="http://schemas.microsoft.com/office/drawing/2014/main" id="{56370054-45B6-FE84-EE9A-AAE2E1DB87A7}"/>
+              </a:ext>
+            </a:extLst>
+          </p:cNvPr>
+          <p:cNvSpPr txBox="1"/>
+          <p:nvPr/>
+        </p:nvSpPr>
+        <p:spPr>
+          <a:xfrm>
+            <a:off x="5431544" y="3410194"/>
+            <a:ext cx="939358" cy="246221"/>
+          </a:xfrm>
+          <a:prstGeom prst="rect">
+            <a:avLst/>
+          </a:prstGeom>
+          <a:noFill/>
+        </p:spPr>
+        <p:txBody>
+          <a:bodyPr wrap="square">
+            <a:spAutoFit/>
+          </a:bodyPr>
+          <a:lstStyle/>
+          <a:p>
+            <a:r>
+              <a:rPr lang="en-GB" sz="1000" dirty="0">
+                <a:solidFill>
+                  <a:schemeClr val="accent4"/>
+                </a:solidFill>
+                <a:latin typeface="Inter" panose="020B0604020202020204" charset="0"/>
+                <a:ea typeface="Inter" panose="020B0604020202020204" charset="0"/>
+              </a:rPr>
+              <a:t>T. Graf</a:t>
+            </a:r>
+            <a:endParaRPr lang="de-CH" sz="1000" dirty="0">
+              <a:solidFill>
+                <a:schemeClr val="accent4"/>
+              </a:solidFill>
+              <a:latin typeface="Inter" panose="020B0604020202020204" charset="0"/>
+              <a:ea typeface="Inter" panose="020B0604020202020204" charset="0"/>
+            </a:endParaRPr>
+          </a:p>
+        </p:txBody>
+      </p:sp>
     </p:spTree>
     <p:extLst>
       <p:ext uri="{BB962C8B-B14F-4D97-AF65-F5344CB8AC3E}">
@@ -22436,6 +22617,7 @@
 
 <file path=docMetadata/LabelInfo.xml><?xml version="1.0" encoding="utf-8"?>
 <clbl:labelList xmlns:clbl="http://schemas.microsoft.com/office/2020/mipLabelMetadata">
+  <clbl:label id="{2e1fccfb-80ca-4fe1-a574-1516544edb53}" enabled="1" method="Standard" siteId="{364e5b87-c1c7-420d-9bee-c35d19b557a1}" removed="0"/>
   <clbl:label id="{92e84ceb-fbfd-47ab-be52-080c6b87953f}" enabled="0" method="" siteId="{92e84ceb-fbfd-47ab-be52-080c6b87953f}" removed="1"/>
 </clbl:labelList>
 </file>
</xml_diff>